<commit_message>
Update to Group 3 Presentation
</commit_message>
<xml_diff>
--- a/Project_Workflow/Group 3 Project - PHS Scotland.pptx
+++ b/Project_Workflow/Group 3 Project - PHS Scotland.pptx
@@ -110,6 +110,11 @@
       </a:defRPr>
     </a:lvl9pPr>
   </p:defaultTextStyle>
+  <p:extLst>
+    <p:ext uri="{EFAFB233-063F-42B5-8137-9DF3F51BA10A}">
+      <p15:sldGuideLst xmlns:p15="http://schemas.microsoft.com/office/powerpoint/2012/main"/>
+    </p:ext>
+  </p:extLst>
 </p:presentation>
 </file>
 
@@ -955,7 +960,7 @@
         <a:p>
           <a:r>
             <a:rPr lang="en-US" dirty="0"/>
-            <a:t>1.</a:t>
+            <a:t>1. % Bed Occupancy  Varies &amp; During Pandemic Occupancy Dropped</a:t>
           </a:r>
         </a:p>
       </dgm:t>
@@ -991,7 +996,7 @@
         <a:p>
           <a:r>
             <a:rPr lang="en-US" dirty="0"/>
-            <a:t>2.</a:t>
+            <a:t>2. Delayed Discharge – Most Vulnerable– Admissions Increases</a:t>
           </a:r>
         </a:p>
       </dgm:t>
@@ -1027,7 +1032,7 @@
         <a:p>
           <a:r>
             <a:rPr lang="en-GB" dirty="0"/>
-            <a:t>3. </a:t>
+            <a:t>3. Delayed Discharge  - Main Reasons related  to Health &amp; Social Care</a:t>
           </a:r>
           <a:endParaRPr lang="en-US" dirty="0"/>
         </a:p>
@@ -1064,7 +1069,15 @@
         <a:p>
           <a:r>
             <a:rPr lang="en-US" dirty="0"/>
-            <a:t>4.</a:t>
+            <a:t>4. A&amp;E -  On average hospitals don’t always meet 4 </a:t>
+          </a:r>
+          <a:r>
+            <a:rPr lang="en-US" dirty="0" err="1"/>
+            <a:t>hr</a:t>
+          </a:r>
+          <a:r>
+            <a:rPr lang="en-US" dirty="0"/>
+            <a:t> target.</a:t>
           </a:r>
         </a:p>
       </dgm:t>
@@ -1103,7 +1116,7 @@
         <a:p>
           <a:r>
             <a:rPr lang="en-US" dirty="0"/>
-            <a:t>5.</a:t>
+            <a:t>5.  That further data would enhance predictability modelling.</a:t>
           </a:r>
         </a:p>
       </dgm:t>
@@ -1138,10 +1151,9 @@
         <a:lstStyle/>
         <a:p>
           <a:r>
-            <a:rPr lang="en-GB" b="1"/>
-            <a:t>Consider:  Temporal,  Demographic  &amp; Geographic  Aspects. </a:t>
+            <a:rPr lang="en-US" dirty="0"/>
+            <a:t>e.g. Staffing Numbers, vaccination.</a:t>
           </a:r>
-          <a:endParaRPr lang="en-US"/>
         </a:p>
       </dgm:t>
     </dgm:pt>
@@ -1177,7 +1189,7 @@
       <dgm:spPr/>
     </dgm:pt>
     <dgm:pt modelId="{571F095E-4513-194F-A94A-B0B956081CCB}" type="pres">
-      <dgm:prSet presAssocID="{774FA94D-16F6-4111-97BB-EB6D03687FF4}" presName="parentText" presStyleLbl="node1" presStyleIdx="0" presStyleCnt="7">
+      <dgm:prSet presAssocID="{774FA94D-16F6-4111-97BB-EB6D03687FF4}" presName="parentText" presStyleLbl="node1" presStyleIdx="0" presStyleCnt="7" custLinFactY="-48692" custLinFactNeighborX="-3869" custLinFactNeighborY="-100000">
         <dgm:presLayoutVars>
           <dgm:chMax val="0"/>
           <dgm:bulletEnabled val="1"/>
@@ -1319,8 +1331,8 @@
       </dsp:nvSpPr>
       <dsp:spPr>
         <a:xfrm>
-          <a:off x="0" y="119308"/>
-          <a:ext cx="4016116" cy="411492"/>
+          <a:off x="0" y="0"/>
+          <a:ext cx="4352980" cy="502935"/>
         </a:xfrm>
         <a:prstGeom prst="roundRect">
           <a:avLst/>
@@ -1368,12 +1380,12 @@
         </a:fontRef>
       </dsp:style>
       <dsp:txBody>
-        <a:bodyPr spcFirstLastPara="0" vert="horz" wrap="square" lIns="34290" tIns="34290" rIns="34290" bIns="34290" numCol="1" spcCol="1270" anchor="ctr" anchorCtr="0">
+        <a:bodyPr spcFirstLastPara="0" vert="horz" wrap="square" lIns="41910" tIns="41910" rIns="41910" bIns="41910" numCol="1" spcCol="1270" anchor="ctr" anchorCtr="0">
           <a:noAutofit/>
         </a:bodyPr>
         <a:lstStyle/>
         <a:p>
-          <a:pPr marL="0" lvl="0" indent="0" algn="l" defTabSz="400050">
+          <a:pPr marL="0" lvl="0" indent="0" algn="l" defTabSz="488950">
             <a:lnSpc>
               <a:spcPct val="90000"/>
             </a:lnSpc>
@@ -1386,15 +1398,15 @@
             <a:buNone/>
           </a:pPr>
           <a:r>
-            <a:rPr lang="en-GB" sz="900" b="1" kern="1200" dirty="0"/>
+            <a:rPr lang="en-GB" sz="1100" b="1" kern="1200" dirty="0"/>
             <a:t>Key Findings &amp; Observations:</a:t>
           </a:r>
-          <a:endParaRPr lang="en-US" sz="900" kern="1200" dirty="0"/>
+          <a:endParaRPr lang="en-US" sz="1100" kern="1200" dirty="0"/>
         </a:p>
       </dsp:txBody>
       <dsp:txXfrm>
-        <a:off x="20087" y="139395"/>
-        <a:ext cx="3975942" cy="371318"/>
+        <a:off x="24551" y="24551"/>
+        <a:ext cx="4303878" cy="453833"/>
       </dsp:txXfrm>
     </dsp:sp>
     <dsp:sp modelId="{73B26CF2-E6D3-A946-B891-79B9E9D66899}">
@@ -1404,8 +1416,8 @@
       </dsp:nvSpPr>
       <dsp:spPr>
         <a:xfrm>
-          <a:off x="0" y="556721"/>
-          <a:ext cx="4016116" cy="411492"/>
+          <a:off x="0" y="563048"/>
+          <a:ext cx="4352980" cy="502935"/>
         </a:xfrm>
         <a:prstGeom prst="roundRect">
           <a:avLst/>
@@ -1453,12 +1465,12 @@
         </a:fontRef>
       </dsp:style>
       <dsp:txBody>
-        <a:bodyPr spcFirstLastPara="0" vert="horz" wrap="square" lIns="34290" tIns="34290" rIns="34290" bIns="34290" numCol="1" spcCol="1270" anchor="ctr" anchorCtr="0">
+        <a:bodyPr spcFirstLastPara="0" vert="horz" wrap="square" lIns="41910" tIns="41910" rIns="41910" bIns="41910" numCol="1" spcCol="1270" anchor="ctr" anchorCtr="0">
           <a:noAutofit/>
         </a:bodyPr>
         <a:lstStyle/>
         <a:p>
-          <a:pPr marL="0" lvl="0" indent="0" algn="l" defTabSz="400050">
+          <a:pPr marL="0" lvl="0" indent="0" algn="l" defTabSz="488950">
             <a:lnSpc>
               <a:spcPct val="90000"/>
             </a:lnSpc>
@@ -1471,14 +1483,14 @@
             <a:buNone/>
           </a:pPr>
           <a:r>
-            <a:rPr lang="en-US" sz="900" kern="1200" dirty="0"/>
-            <a:t>1.</a:t>
+            <a:rPr lang="en-US" sz="1100" kern="1200" dirty="0"/>
+            <a:t>1. % Bed Occupancy  Varies &amp; During Pandemic Occupancy Dropped</a:t>
           </a:r>
         </a:p>
       </dsp:txBody>
       <dsp:txXfrm>
-        <a:off x="20087" y="576808"/>
-        <a:ext cx="3975942" cy="371318"/>
+        <a:off x="24551" y="587599"/>
+        <a:ext cx="4303878" cy="453833"/>
       </dsp:txXfrm>
     </dsp:sp>
     <dsp:sp modelId="{6257FC33-AA03-7345-9A26-93C4275CC3A9}">
@@ -1488,8 +1500,8 @@
       </dsp:nvSpPr>
       <dsp:spPr>
         <a:xfrm>
-          <a:off x="0" y="994134"/>
-          <a:ext cx="4016116" cy="411492"/>
+          <a:off x="0" y="1097664"/>
+          <a:ext cx="4352980" cy="502935"/>
         </a:xfrm>
         <a:prstGeom prst="roundRect">
           <a:avLst/>
@@ -1537,12 +1549,12 @@
         </a:fontRef>
       </dsp:style>
       <dsp:txBody>
-        <a:bodyPr spcFirstLastPara="0" vert="horz" wrap="square" lIns="34290" tIns="34290" rIns="34290" bIns="34290" numCol="1" spcCol="1270" anchor="ctr" anchorCtr="0">
+        <a:bodyPr spcFirstLastPara="0" vert="horz" wrap="square" lIns="41910" tIns="41910" rIns="41910" bIns="41910" numCol="1" spcCol="1270" anchor="ctr" anchorCtr="0">
           <a:noAutofit/>
         </a:bodyPr>
         <a:lstStyle/>
         <a:p>
-          <a:pPr marL="0" lvl="0" indent="0" algn="l" defTabSz="400050">
+          <a:pPr marL="0" lvl="0" indent="0" algn="l" defTabSz="488950">
             <a:lnSpc>
               <a:spcPct val="90000"/>
             </a:lnSpc>
@@ -1555,14 +1567,14 @@
             <a:buNone/>
           </a:pPr>
           <a:r>
-            <a:rPr lang="en-US" sz="900" kern="1200" dirty="0"/>
-            <a:t>2.</a:t>
+            <a:rPr lang="en-US" sz="1100" kern="1200" dirty="0"/>
+            <a:t>2. Delayed Discharge – Most Vulnerable– Admissions Increases</a:t>
           </a:r>
         </a:p>
       </dsp:txBody>
       <dsp:txXfrm>
-        <a:off x="20087" y="1014221"/>
-        <a:ext cx="3975942" cy="371318"/>
+        <a:off x="24551" y="1122215"/>
+        <a:ext cx="4303878" cy="453833"/>
       </dsp:txXfrm>
     </dsp:sp>
     <dsp:sp modelId="{8A561229-CC6A-CF4E-AA29-C2EE5CF7E73C}">
@@ -1572,8 +1584,8 @@
       </dsp:nvSpPr>
       <dsp:spPr>
         <a:xfrm>
-          <a:off x="0" y="1431546"/>
-          <a:ext cx="4016116" cy="411492"/>
+          <a:off x="0" y="1632279"/>
+          <a:ext cx="4352980" cy="502935"/>
         </a:xfrm>
         <a:prstGeom prst="roundRect">
           <a:avLst/>
@@ -1621,12 +1633,12 @@
         </a:fontRef>
       </dsp:style>
       <dsp:txBody>
-        <a:bodyPr spcFirstLastPara="0" vert="horz" wrap="square" lIns="34290" tIns="34290" rIns="34290" bIns="34290" numCol="1" spcCol="1270" anchor="ctr" anchorCtr="0">
+        <a:bodyPr spcFirstLastPara="0" vert="horz" wrap="square" lIns="41910" tIns="41910" rIns="41910" bIns="41910" numCol="1" spcCol="1270" anchor="ctr" anchorCtr="0">
           <a:noAutofit/>
         </a:bodyPr>
         <a:lstStyle/>
         <a:p>
-          <a:pPr marL="0" lvl="0" indent="0" algn="l" defTabSz="400050">
+          <a:pPr marL="0" lvl="0" indent="0" algn="l" defTabSz="488950">
             <a:lnSpc>
               <a:spcPct val="90000"/>
             </a:lnSpc>
@@ -1639,15 +1651,15 @@
             <a:buNone/>
           </a:pPr>
           <a:r>
-            <a:rPr lang="en-GB" sz="900" kern="1200" dirty="0"/>
-            <a:t>3. </a:t>
+            <a:rPr lang="en-GB" sz="1100" kern="1200" dirty="0"/>
+            <a:t>3. Delayed Discharge  - Main Reasons related  to Health &amp; Social Care</a:t>
           </a:r>
-          <a:endParaRPr lang="en-US" sz="900" kern="1200" dirty="0"/>
+          <a:endParaRPr lang="en-US" sz="1100" kern="1200" dirty="0"/>
         </a:p>
       </dsp:txBody>
       <dsp:txXfrm>
-        <a:off x="20087" y="1451633"/>
-        <a:ext cx="3975942" cy="371318"/>
+        <a:off x="24551" y="1656830"/>
+        <a:ext cx="4303878" cy="453833"/>
       </dsp:txXfrm>
     </dsp:sp>
     <dsp:sp modelId="{3C5DB99F-C869-2543-B31E-B91DD59AD0E3}">
@@ -1657,8 +1669,8 @@
       </dsp:nvSpPr>
       <dsp:spPr>
         <a:xfrm>
-          <a:off x="0" y="1868959"/>
-          <a:ext cx="4016116" cy="411492"/>
+          <a:off x="0" y="2166895"/>
+          <a:ext cx="4352980" cy="502935"/>
         </a:xfrm>
         <a:prstGeom prst="roundRect">
           <a:avLst/>
@@ -1706,12 +1718,12 @@
         </a:fontRef>
       </dsp:style>
       <dsp:txBody>
-        <a:bodyPr spcFirstLastPara="0" vert="horz" wrap="square" lIns="34290" tIns="34290" rIns="34290" bIns="34290" numCol="1" spcCol="1270" anchor="ctr" anchorCtr="0">
+        <a:bodyPr spcFirstLastPara="0" vert="horz" wrap="square" lIns="41910" tIns="41910" rIns="41910" bIns="41910" numCol="1" spcCol="1270" anchor="ctr" anchorCtr="0">
           <a:noAutofit/>
         </a:bodyPr>
         <a:lstStyle/>
         <a:p>
-          <a:pPr marL="0" lvl="0" indent="0" algn="l" defTabSz="400050">
+          <a:pPr marL="0" lvl="0" indent="0" algn="l" defTabSz="488950">
             <a:lnSpc>
               <a:spcPct val="90000"/>
             </a:lnSpc>
@@ -1724,14 +1736,22 @@
             <a:buNone/>
           </a:pPr>
           <a:r>
-            <a:rPr lang="en-US" sz="900" kern="1200" dirty="0"/>
-            <a:t>4.</a:t>
+            <a:rPr lang="en-US" sz="1100" kern="1200" dirty="0"/>
+            <a:t>4. A&amp;E -  On average hospitals don’t always meet 4 </a:t>
+          </a:r>
+          <a:r>
+            <a:rPr lang="en-US" sz="1100" kern="1200" dirty="0" err="1"/>
+            <a:t>hr</a:t>
+          </a:r>
+          <a:r>
+            <a:rPr lang="en-US" sz="1100" kern="1200" dirty="0"/>
+            <a:t> target.</a:t>
           </a:r>
         </a:p>
       </dsp:txBody>
       <dsp:txXfrm>
-        <a:off x="20087" y="1889046"/>
-        <a:ext cx="3975942" cy="371318"/>
+        <a:off x="24551" y="2191446"/>
+        <a:ext cx="4303878" cy="453833"/>
       </dsp:txXfrm>
     </dsp:sp>
     <dsp:sp modelId="{E9866504-7091-0B4F-AC65-696E781BDDA2}">
@@ -1741,8 +1761,8 @@
       </dsp:nvSpPr>
       <dsp:spPr>
         <a:xfrm>
-          <a:off x="0" y="2306371"/>
-          <a:ext cx="4016116" cy="411492"/>
+          <a:off x="0" y="2701510"/>
+          <a:ext cx="4352980" cy="502935"/>
         </a:xfrm>
         <a:prstGeom prst="roundRect">
           <a:avLst/>
@@ -1790,12 +1810,12 @@
         </a:fontRef>
       </dsp:style>
       <dsp:txBody>
-        <a:bodyPr spcFirstLastPara="0" vert="horz" wrap="square" lIns="34290" tIns="34290" rIns="34290" bIns="34290" numCol="1" spcCol="1270" anchor="ctr" anchorCtr="0">
+        <a:bodyPr spcFirstLastPara="0" vert="horz" wrap="square" lIns="41910" tIns="41910" rIns="41910" bIns="41910" numCol="1" spcCol="1270" anchor="ctr" anchorCtr="0">
           <a:noAutofit/>
         </a:bodyPr>
         <a:lstStyle/>
         <a:p>
-          <a:pPr marL="0" lvl="0" indent="0" algn="l" defTabSz="400050">
+          <a:pPr marL="0" lvl="0" indent="0" algn="l" defTabSz="488950">
             <a:lnSpc>
               <a:spcPct val="90000"/>
             </a:lnSpc>
@@ -1807,10 +1827,10 @@
             </a:spcAft>
             <a:buNone/>
           </a:pPr>
-          <a:endParaRPr lang="en-US" sz="900" kern="1200" dirty="0"/>
+          <a:endParaRPr lang="en-US" sz="1100" kern="1200" dirty="0"/>
         </a:p>
         <a:p>
-          <a:pPr marL="0" lvl="0" indent="0" algn="l" defTabSz="400050">
+          <a:pPr marL="0" lvl="0" indent="0" algn="l" defTabSz="488950">
             <a:lnSpc>
               <a:spcPct val="90000"/>
             </a:lnSpc>
@@ -1823,14 +1843,14 @@
             <a:buNone/>
           </a:pPr>
           <a:r>
-            <a:rPr lang="en-US" sz="900" kern="1200" dirty="0"/>
-            <a:t>5.</a:t>
+            <a:rPr lang="en-US" sz="1100" kern="1200" dirty="0"/>
+            <a:t>5.  That further data would enhance predictability modelling.</a:t>
           </a:r>
         </a:p>
       </dsp:txBody>
       <dsp:txXfrm>
-        <a:off x="20087" y="2326458"/>
-        <a:ext cx="3975942" cy="371318"/>
+        <a:off x="24551" y="2726061"/>
+        <a:ext cx="4303878" cy="453833"/>
       </dsp:txXfrm>
     </dsp:sp>
     <dsp:sp modelId="{9767335C-230A-0A49-B3D6-0104D918FD42}">
@@ -1840,8 +1860,8 @@
       </dsp:nvSpPr>
       <dsp:spPr>
         <a:xfrm>
-          <a:off x="0" y="2743784"/>
-          <a:ext cx="4016116" cy="411492"/>
+          <a:off x="0" y="3236126"/>
+          <a:ext cx="4352980" cy="502935"/>
         </a:xfrm>
         <a:prstGeom prst="roundRect">
           <a:avLst/>
@@ -1889,12 +1909,12 @@
         </a:fontRef>
       </dsp:style>
       <dsp:txBody>
-        <a:bodyPr spcFirstLastPara="0" vert="horz" wrap="square" lIns="34290" tIns="34290" rIns="34290" bIns="34290" numCol="1" spcCol="1270" anchor="ctr" anchorCtr="0">
+        <a:bodyPr spcFirstLastPara="0" vert="horz" wrap="square" lIns="41910" tIns="41910" rIns="41910" bIns="41910" numCol="1" spcCol="1270" anchor="ctr" anchorCtr="0">
           <a:noAutofit/>
         </a:bodyPr>
         <a:lstStyle/>
         <a:p>
-          <a:pPr marL="0" lvl="0" indent="0" algn="l" defTabSz="400050">
+          <a:pPr marL="0" lvl="0" indent="0" algn="l" defTabSz="488950">
             <a:lnSpc>
               <a:spcPct val="90000"/>
             </a:lnSpc>
@@ -1907,15 +1927,14 @@
             <a:buNone/>
           </a:pPr>
           <a:r>
-            <a:rPr lang="en-GB" sz="900" b="1" kern="1200"/>
-            <a:t>Consider:  Temporal,  Demographic  &amp; Geographic  Aspects. </a:t>
+            <a:rPr lang="en-US" sz="1100" kern="1200" dirty="0"/>
+            <a:t>e.g. Staffing Numbers, vaccination.</a:t>
           </a:r>
-          <a:endParaRPr lang="en-US" sz="900" kern="1200"/>
         </a:p>
       </dsp:txBody>
       <dsp:txXfrm>
-        <a:off x="20087" y="2763871"/>
-        <a:ext cx="3975942" cy="371318"/>
+        <a:off x="24551" y="3260677"/>
+        <a:ext cx="4303878" cy="453833"/>
       </dsp:txXfrm>
     </dsp:sp>
   </dsp:spTree>
@@ -3348,7 +3367,7 @@
             <a:fld id="{5586B75A-687E-405C-8A0B-8D00578BA2C3}" type="datetimeFigureOut">
               <a:rPr lang="en-US" dirty="0"/>
               <a:pPr/>
-              <a:t>4/27/22</a:t>
+              <a:t>4/28/22</a:t>
             </a:fld>
             <a:endParaRPr lang="en-US" dirty="0"/>
           </a:p>
@@ -3515,7 +3534,7 @@
             <a:fld id="{5586B75A-687E-405C-8A0B-8D00578BA2C3}" type="datetimeFigureOut">
               <a:rPr lang="en-US" dirty="0"/>
               <a:pPr/>
-              <a:t>4/27/22</a:t>
+              <a:t>4/28/22</a:t>
             </a:fld>
             <a:endParaRPr lang="en-US" dirty="0"/>
           </a:p>
@@ -3692,7 +3711,7 @@
             <a:fld id="{5586B75A-687E-405C-8A0B-8D00578BA2C3}" type="datetimeFigureOut">
               <a:rPr lang="en-US" dirty="0"/>
               <a:pPr/>
-              <a:t>4/27/22</a:t>
+              <a:t>4/28/22</a:t>
             </a:fld>
             <a:endParaRPr lang="en-US" dirty="0"/>
           </a:p>
@@ -3859,7 +3878,7 @@
             <a:fld id="{5586B75A-687E-405C-8A0B-8D00578BA2C3}" type="datetimeFigureOut">
               <a:rPr lang="en-US" dirty="0"/>
               <a:pPr/>
-              <a:t>4/27/22</a:t>
+              <a:t>4/28/22</a:t>
             </a:fld>
             <a:endParaRPr lang="en-US" dirty="0"/>
           </a:p>
@@ -4114,7 +4133,7 @@
             <a:fld id="{5586B75A-687E-405C-8A0B-8D00578BA2C3}" type="datetimeFigureOut">
               <a:rPr lang="en-US" dirty="0"/>
               <a:pPr/>
-              <a:t>4/27/22</a:t>
+              <a:t>4/28/22</a:t>
             </a:fld>
             <a:endParaRPr lang="en-US" dirty="0"/>
           </a:p>
@@ -4399,7 +4418,7 @@
             <a:fld id="{5586B75A-687E-405C-8A0B-8D00578BA2C3}" type="datetimeFigureOut">
               <a:rPr lang="en-US" dirty="0"/>
               <a:pPr/>
-              <a:t>4/27/22</a:t>
+              <a:t>4/28/22</a:t>
             </a:fld>
             <a:endParaRPr lang="en-US" dirty="0"/>
           </a:p>
@@ -4838,7 +4857,7 @@
             <a:fld id="{5586B75A-687E-405C-8A0B-8D00578BA2C3}" type="datetimeFigureOut">
               <a:rPr lang="en-US" dirty="0"/>
               <a:pPr/>
-              <a:t>4/27/22</a:t>
+              <a:t>4/28/22</a:t>
             </a:fld>
             <a:endParaRPr lang="en-US" dirty="0"/>
           </a:p>
@@ -4953,7 +4972,7 @@
             <a:fld id="{5586B75A-687E-405C-8A0B-8D00578BA2C3}" type="datetimeFigureOut">
               <a:rPr lang="en-US" dirty="0"/>
               <a:pPr/>
-              <a:t>4/27/22</a:t>
+              <a:t>4/28/22</a:t>
             </a:fld>
             <a:endParaRPr lang="en-US" dirty="0"/>
           </a:p>
@@ -5045,7 +5064,7 @@
             <a:fld id="{5586B75A-687E-405C-8A0B-8D00578BA2C3}" type="datetimeFigureOut">
               <a:rPr lang="en-US" dirty="0"/>
               <a:pPr/>
-              <a:t>4/27/22</a:t>
+              <a:t>4/28/22</a:t>
             </a:fld>
             <a:endParaRPr lang="en-US" dirty="0"/>
           </a:p>
@@ -5330,7 +5349,7 @@
             <a:fld id="{5586B75A-687E-405C-8A0B-8D00578BA2C3}" type="datetimeFigureOut">
               <a:rPr lang="en-US" dirty="0"/>
               <a:pPr/>
-              <a:t>4/27/22</a:t>
+              <a:t>4/28/22</a:t>
             </a:fld>
             <a:endParaRPr lang="en-US" dirty="0"/>
           </a:p>
@@ -5600,7 +5619,7 @@
             <a:fld id="{5586B75A-687E-405C-8A0B-8D00578BA2C3}" type="datetimeFigureOut">
               <a:rPr lang="en-US" dirty="0"/>
               <a:pPr/>
-              <a:t>4/27/22</a:t>
+              <a:t>4/28/22</a:t>
             </a:fld>
             <a:endParaRPr lang="en-US" dirty="0"/>
           </a:p>
@@ -5894,7 +5913,7 @@
             <a:fld id="{5586B75A-687E-405C-8A0B-8D00578BA2C3}" type="datetimeFigureOut">
               <a:rPr lang="en-US" dirty="0"/>
               <a:pPr/>
-              <a:t>4/27/22</a:t>
+              <a:t>4/28/22</a:t>
             </a:fld>
             <a:endParaRPr lang="en-US" dirty="0"/>
           </a:p>
@@ -8590,7 +8609,7 @@
         </p:nvSpPr>
         <p:spPr>
           <a:xfrm>
-            <a:off x="289249" y="1123837"/>
+            <a:off x="289249" y="621174"/>
             <a:ext cx="4016116" cy="1255469"/>
           </a:xfrm>
         </p:spPr>
@@ -8711,14 +8730,14 @@
           <p:nvPr>
             <p:extLst>
               <p:ext uri="{D42A27DB-BD31-4B8C-83A1-F6EECF244321}">
-                <p14:modId xmlns:p14="http://schemas.microsoft.com/office/powerpoint/2010/main" val="2987347392"/>
+                <p14:modId xmlns:p14="http://schemas.microsoft.com/office/powerpoint/2010/main" val="363533632"/>
               </p:ext>
             </p:extLst>
           </p:nvPr>
         </p:nvGraphicFramePr>
         <p:xfrm>
-          <a:off x="289249" y="2510395"/>
-          <a:ext cx="4016116" cy="3274586"/>
+          <a:off x="120817" y="1859636"/>
+          <a:ext cx="4352980" cy="3767495"/>
         </p:xfrm>
         <a:graphic>
           <a:graphicData uri="http://schemas.openxmlformats.org/drawingml/2006/diagram">
@@ -8740,8 +8759,8 @@
         </p:nvSpPr>
         <p:spPr>
           <a:xfrm>
-            <a:off x="5401339" y="1466100"/>
-            <a:ext cx="6150586" cy="2031325"/>
+            <a:off x="5139416" y="1156835"/>
+            <a:ext cx="6150586" cy="5909310"/>
           </a:xfrm>
           <a:prstGeom prst="rect">
             <a:avLst/>
@@ -8775,14 +8794,76 @@
             </a:pPr>
             <a:r>
               <a:rPr lang="en-GB" dirty="0"/>
-              <a:t>Summarise against brief &amp; provide</a:t>
+              <a:t>What the media predicts has some substance but using data</a:t>
             </a:r>
           </a:p>
           <a:p>
             <a:r>
               <a:rPr lang="en-GB" dirty="0"/>
-              <a:t>Future development ideas.</a:t>
+              <a:t>provides a more accurate insight into these  winter predictions.</a:t>
             </a:r>
+          </a:p>
+          <a:p>
+            <a:endParaRPr lang="en-GB" dirty="0"/>
+          </a:p>
+          <a:p>
+            <a:pPr marL="285750" indent="-285750">
+              <a:buFont typeface="Arial" panose="020B0604020202020204" pitchFamily="34" charset="0"/>
+              <a:buChar char="•"/>
+            </a:pPr>
+            <a:r>
+              <a:rPr lang="en-GB" dirty="0"/>
+              <a:t>The pandemic did have an impact  on secondary care in the acute hospital sector.</a:t>
+            </a:r>
+          </a:p>
+          <a:p>
+            <a:pPr marL="285750" indent="-285750">
+              <a:buFont typeface="Arial" panose="020B0604020202020204" pitchFamily="34" charset="0"/>
+              <a:buChar char="•"/>
+            </a:pPr>
+            <a:endParaRPr lang="en-GB" dirty="0"/>
+          </a:p>
+          <a:p>
+            <a:pPr marL="285750" indent="-285750">
+              <a:buFont typeface="Arial" panose="020B0604020202020204" pitchFamily="34" charset="0"/>
+              <a:buChar char="•"/>
+            </a:pPr>
+            <a:r>
+              <a:rPr lang="en-GB" dirty="0"/>
+              <a:t>If the pandemic continues we could see similar trends as  shown in past years. </a:t>
+            </a:r>
+          </a:p>
+          <a:p>
+            <a:pPr marL="285750" indent="-285750">
+              <a:buFont typeface="Arial" panose="020B0604020202020204" pitchFamily="34" charset="0"/>
+              <a:buChar char="•"/>
+            </a:pPr>
+            <a:endParaRPr lang="en-GB" dirty="0"/>
+          </a:p>
+          <a:p>
+            <a:endParaRPr lang="en-GB" dirty="0"/>
+          </a:p>
+          <a:p>
+            <a:endParaRPr lang="en-GB" dirty="0"/>
+          </a:p>
+          <a:p>
+            <a:endParaRPr lang="en-GB" dirty="0"/>
+          </a:p>
+          <a:p>
+            <a:endParaRPr lang="en-GB" dirty="0"/>
+          </a:p>
+          <a:p>
+            <a:pPr marL="285750" indent="-285750">
+              <a:buFont typeface="Arial" panose="020B0604020202020204" pitchFamily="34" charset="0"/>
+              <a:buChar char="•"/>
+            </a:pPr>
+            <a:endParaRPr lang="en-GB" dirty="0"/>
+          </a:p>
+          <a:p>
+            <a:endParaRPr lang="en-GB" dirty="0"/>
+          </a:p>
+          <a:p>
+            <a:endParaRPr lang="en-GB" dirty="0"/>
           </a:p>
           <a:p>
             <a:endParaRPr lang="en-GB" b="1" dirty="0"/>

</xml_diff>